<commit_message>
Updated font to Courier New in HTTP and APIs
</commit_message>
<xml_diff>
--- a/Python/Lesson 99 - HTTP and APIs/AI2C Python - HTTP and APIs.pptx
+++ b/Python/Lesson 99 - HTTP and APIs/AI2C Python - HTTP and APIs.pptx
@@ -125,7 +125,7 @@
 <file path=ppt/revisionInfo.xml><?xml version="1.0" encoding="utf-8"?>
 <p1510:revInfo xmlns:a="http://schemas.openxmlformats.org/drawingml/2006/main" xmlns:r="http://schemas.openxmlformats.org/officeDocument/2006/relationships" xmlns:p1510="http://schemas.microsoft.com/office/powerpoint/2015/10/main">
   <p1510:revLst>
-    <p1510:client id="{9470EC83-8C30-44C4-7BB3-892BB0B89F42}" v="321" dt="2025-12-23T16:30:05.736"/>
+    <p1510:client id="{9470EC83-8C30-44C4-7BB3-892BB0B89F42}" v="333" dt="2025-12-23T16:43:35.240"/>
   </p1510:revLst>
 </p1510:revInfo>
 </file>
@@ -21254,15 +21254,17 @@
                 <a:solidFill>
                   <a:schemeClr val="bg2"/>
                 </a:solidFill>
+                <a:latin typeface="Courier New"/>
                 <a:ea typeface="+mn-lt"/>
                 <a:cs typeface="+mn-lt"/>
               </a:rPr>
               <a:t>GET /test HTTP/1.1\r\n </a:t>
             </a:r>
-            <a:endParaRPr lang="en-US" sz="2400" dirty="0">
+            <a:endParaRPr lang="en-US" sz="2400">
               <a:solidFill>
                 <a:schemeClr val="bg2"/>
               </a:solidFill>
+              <a:latin typeface="Courier New"/>
               <a:cs typeface="Arial"/>
             </a:endParaRPr>
           </a:p>
@@ -21275,22 +21277,126 @@
                 <a:solidFill>
                   <a:schemeClr val="bg2"/>
                 </a:solidFill>
+                <a:latin typeface="Courier New"/>
                 <a:ea typeface="+mn-lt"/>
                 <a:cs typeface="+mn-lt"/>
               </a:rPr>
               <a:t>Host: example.com\r\n </a:t>
             </a:r>
+            <a:endParaRPr lang="en-US">
+              <a:solidFill>
+                <a:schemeClr val="bg2"/>
+              </a:solidFill>
+              <a:latin typeface="Courier New"/>
+              <a:cs typeface="Arial"/>
+            </a:endParaRPr>
+          </a:p>
+          <a:p>
+            <a:pPr marL="0" indent="0">
+              <a:buNone/>
+            </a:pPr>
+            <a:r>
+              <a:rPr lang="en-US" sz="2400" dirty="0">
+                <a:solidFill>
+                  <a:schemeClr val="bg2"/>
+                </a:solidFill>
+                <a:latin typeface="Courier New"/>
+                <a:ea typeface="+mn-lt"/>
+                <a:cs typeface="+mn-lt"/>
+              </a:rPr>
+              <a:t>Accept: */*\r\n </a:t>
+            </a:r>
+            <a:endParaRPr lang="en-US">
+              <a:solidFill>
+                <a:schemeClr val="bg2"/>
+              </a:solidFill>
+              <a:latin typeface="Courier New"/>
+              <a:cs typeface="Arial"/>
+            </a:endParaRPr>
+          </a:p>
+          <a:p>
+            <a:pPr marL="0" indent="0">
+              <a:buNone/>
+            </a:pPr>
+            <a:r>
+              <a:rPr lang="en-US" sz="2400" dirty="0">
+                <a:solidFill>
+                  <a:schemeClr val="bg2"/>
+                </a:solidFill>
+                <a:latin typeface="Courier New"/>
+                <a:ea typeface="+mn-lt"/>
+                <a:cs typeface="+mn-lt"/>
+              </a:rPr>
+              <a:t>\r\n </a:t>
+            </a:r>
+            <a:endParaRPr lang="en-US">
+              <a:solidFill>
+                <a:schemeClr val="bg2"/>
+              </a:solidFill>
+              <a:latin typeface="Courier New"/>
+              <a:cs typeface="Arial"/>
+            </a:endParaRPr>
+          </a:p>
+          <a:p>
+            <a:pPr marL="0" indent="0">
+              <a:buNone/>
+            </a:pPr>
+            <a:r>
+              <a:rPr lang="en-US" sz="2400" dirty="0">
+                <a:solidFill>
+                  <a:schemeClr val="bg2"/>
+                </a:solidFill>
+                <a:latin typeface="Courier New"/>
+                <a:ea typeface="+mn-lt"/>
+                <a:cs typeface="+mn-lt"/>
+              </a:rPr>
+              <a:t>{"param"="hello"}\r\n </a:t>
+            </a:r>
             <a:endParaRPr lang="en-US" dirty="0">
               <a:solidFill>
                 <a:schemeClr val="bg2"/>
               </a:solidFill>
+              <a:latin typeface="Courier New"/>
               <a:cs typeface="Arial"/>
             </a:endParaRPr>
           </a:p>
           <a:p>
-            <a:pPr marL="0" indent="0">
-              <a:buNone/>
-            </a:pPr>
+            <a:endParaRPr lang="en-US"/>
+          </a:p>
+          <a:p>
+            <a:endParaRPr lang="en-US"/>
+          </a:p>
+          <a:p>
+            <a:endParaRPr lang="en-US"/>
+          </a:p>
+          <a:p>
+            <a:endParaRPr lang="en-US"/>
+          </a:p>
+        </p:txBody>
+      </p:sp>
+      <p:sp>
+        <p:nvSpPr>
+          <p:cNvPr id="8" name="Content Placeholder 7">
+            <a:extLst>
+              <a:ext uri="{FF2B5EF4-FFF2-40B4-BE49-F238E27FC236}">
+                <a16:creationId xmlns:a16="http://schemas.microsoft.com/office/drawing/2014/main" id="{24E78C1C-E064-347C-2437-40225FA9E3E6}"/>
+              </a:ext>
+            </a:extLst>
+          </p:cNvPr>
+          <p:cNvSpPr>
+            <a:spLocks noGrp="1"/>
+          </p:cNvSpPr>
+          <p:nvPr>
+            <p:ph sz="half" idx="2"/>
+          </p:nvPr>
+        </p:nvSpPr>
+        <p:spPr/>
+        <p:txBody>
+          <a:bodyPr vert="horz" lIns="0" tIns="0" rIns="0" bIns="0" spcCol="365760" rtlCol="0" anchor="t">
+            <a:noAutofit/>
+          </a:bodyPr>
+          <a:lstStyle/>
+          <a:p>
             <a:r>
               <a:rPr lang="en-US" sz="2400" dirty="0">
                 <a:solidFill>
@@ -21299,231 +21405,167 @@
                 <a:ea typeface="+mn-lt"/>
                 <a:cs typeface="+mn-lt"/>
               </a:rPr>
-              <a:t>Accept: */*\r\n </a:t>
+              <a:t>Response:</a:t>
+            </a:r>
+          </a:p>
+          <a:p>
+            <a:pPr marL="0" indent="0">
+              <a:buNone/>
+            </a:pPr>
+            <a:r>
+              <a:rPr lang="en-US" sz="2400" dirty="0">
+                <a:solidFill>
+                  <a:schemeClr val="bg2"/>
+                </a:solidFill>
+                <a:latin typeface="Courier New"/>
+                <a:ea typeface="+mn-lt"/>
+                <a:cs typeface="+mn-lt"/>
+              </a:rPr>
+              <a:t>HTTP/1.1 404 Not Found\r\n </a:t>
+            </a:r>
+            <a:endParaRPr lang="en-US" sz="2400">
+              <a:solidFill>
+                <a:schemeClr val="bg2"/>
+              </a:solidFill>
+              <a:latin typeface="Courier New"/>
+              <a:cs typeface="Arial"/>
+            </a:endParaRPr>
+          </a:p>
+          <a:p>
+            <a:pPr marL="0" indent="0">
+              <a:buNone/>
+            </a:pPr>
+            <a:r>
+              <a:rPr lang="en-US" sz="2400" dirty="0">
+                <a:solidFill>
+                  <a:schemeClr val="bg2"/>
+                </a:solidFill>
+                <a:latin typeface="Courier New"/>
+                <a:ea typeface="+mn-lt"/>
+                <a:cs typeface="+mn-lt"/>
+              </a:rPr>
+              <a:t>Server: Apache/2.0.52\r\n </a:t>
+            </a:r>
+            <a:endParaRPr lang="en-US">
+              <a:solidFill>
+                <a:schemeClr val="bg2"/>
+              </a:solidFill>
+              <a:latin typeface="Courier New"/>
+              <a:cs typeface="Arial"/>
+            </a:endParaRPr>
+          </a:p>
+          <a:p>
+            <a:pPr marL="0" indent="0">
+              <a:buNone/>
+            </a:pPr>
+            <a:r>
+              <a:rPr lang="en-US" sz="2400" dirty="0">
+                <a:solidFill>
+                  <a:schemeClr val="bg2"/>
+                </a:solidFill>
+                <a:latin typeface="Courier New"/>
+                <a:ea typeface="+mn-lt"/>
+                <a:cs typeface="+mn-lt"/>
+              </a:rPr>
+              <a:t>Accept-Ranges: bytes\r\n </a:t>
+            </a:r>
+            <a:endParaRPr lang="en-US">
+              <a:solidFill>
+                <a:schemeClr val="bg2"/>
+              </a:solidFill>
+              <a:latin typeface="Courier New"/>
+              <a:cs typeface="Arial"/>
+            </a:endParaRPr>
+          </a:p>
+          <a:p>
+            <a:pPr marL="0" indent="0">
+              <a:buNone/>
+            </a:pPr>
+            <a:r>
+              <a:rPr lang="en-US" sz="2400" dirty="0">
+                <a:solidFill>
+                  <a:schemeClr val="bg2"/>
+                </a:solidFill>
+                <a:latin typeface="Courier New"/>
+                <a:ea typeface="+mn-lt"/>
+                <a:cs typeface="+mn-lt"/>
+              </a:rPr>
+              <a:t>Content-Length: 2652\r\n </a:t>
+            </a:r>
+            <a:endParaRPr lang="en-US">
+              <a:solidFill>
+                <a:schemeClr val="bg2"/>
+              </a:solidFill>
+              <a:latin typeface="Courier New"/>
+              <a:cs typeface="Arial"/>
+            </a:endParaRPr>
+          </a:p>
+          <a:p>
+            <a:pPr marL="0" indent="0">
+              <a:buNone/>
+            </a:pPr>
+            <a:r>
+              <a:rPr lang="en-US" sz="2400" dirty="0">
+                <a:solidFill>
+                  <a:schemeClr val="bg2"/>
+                </a:solidFill>
+                <a:latin typeface="Courier New"/>
+                <a:ea typeface="+mn-lt"/>
+                <a:cs typeface="+mn-lt"/>
+              </a:rPr>
+              <a:t>Content-Type: text/html;\r\n </a:t>
+            </a:r>
+            <a:endParaRPr lang="en-US">
+              <a:solidFill>
+                <a:schemeClr val="bg2"/>
+              </a:solidFill>
+              <a:latin typeface="Courier New"/>
+              <a:cs typeface="Arial"/>
+            </a:endParaRPr>
+          </a:p>
+          <a:p>
+            <a:pPr marL="0" indent="0">
+              <a:buNone/>
+            </a:pPr>
+            <a:r>
+              <a:rPr lang="en-US" sz="2400" dirty="0">
+                <a:solidFill>
+                  <a:schemeClr val="bg2"/>
+                </a:solidFill>
+                <a:latin typeface="Courier New"/>
+                <a:ea typeface="+mn-lt"/>
+                <a:cs typeface="+mn-lt"/>
+              </a:rPr>
+              <a:t>\r\n </a:t>
+            </a:r>
+            <a:endParaRPr lang="en-US">
+              <a:solidFill>
+                <a:schemeClr val="bg2"/>
+              </a:solidFill>
+              <a:latin typeface="Courier New"/>
+              <a:cs typeface="Arial"/>
+            </a:endParaRPr>
+          </a:p>
+          <a:p>
+            <a:pPr marL="0" indent="0">
+              <a:buNone/>
+            </a:pPr>
+            <a:r>
+              <a:rPr lang="en-US" sz="2400" dirty="0">
+                <a:solidFill>
+                  <a:schemeClr val="bg2"/>
+                </a:solidFill>
+                <a:latin typeface="Courier New"/>
+                <a:ea typeface="+mn-lt"/>
+                <a:cs typeface="+mn-lt"/>
+              </a:rPr>
+              <a:t>&lt;!doctype html&gt;&lt;html ... </a:t>
             </a:r>
             <a:endParaRPr lang="en-US" dirty="0">
               <a:solidFill>
                 <a:schemeClr val="bg2"/>
               </a:solidFill>
-              <a:cs typeface="Arial"/>
-            </a:endParaRPr>
-          </a:p>
-          <a:p>
-            <a:pPr marL="0" indent="0">
-              <a:buNone/>
-            </a:pPr>
-            <a:r>
-              <a:rPr lang="en-US" sz="2400" dirty="0">
-                <a:solidFill>
-                  <a:schemeClr val="bg2"/>
-                </a:solidFill>
-                <a:ea typeface="+mn-lt"/>
-                <a:cs typeface="+mn-lt"/>
-              </a:rPr>
-              <a:t>\r\n </a:t>
-            </a:r>
-            <a:endParaRPr lang="en-US" dirty="0">
-              <a:solidFill>
-                <a:schemeClr val="bg2"/>
-              </a:solidFill>
-              <a:cs typeface="Arial"/>
-            </a:endParaRPr>
-          </a:p>
-          <a:p>
-            <a:pPr marL="0" indent="0">
-              <a:buNone/>
-            </a:pPr>
-            <a:r>
-              <a:rPr lang="en-US" sz="2400" dirty="0">
-                <a:solidFill>
-                  <a:schemeClr val="bg2"/>
-                </a:solidFill>
-                <a:ea typeface="+mn-lt"/>
-                <a:cs typeface="+mn-lt"/>
-              </a:rPr>
-              <a:t>{"param"="hello"}\r\n </a:t>
-            </a:r>
-            <a:endParaRPr lang="en-US" dirty="0">
-              <a:solidFill>
-                <a:schemeClr val="bg2"/>
-              </a:solidFill>
-              <a:cs typeface="Arial"/>
-            </a:endParaRPr>
-          </a:p>
-          <a:p>
-            <a:endParaRPr lang="en-US"/>
-          </a:p>
-          <a:p>
-            <a:endParaRPr lang="en-US"/>
-          </a:p>
-          <a:p>
-            <a:endParaRPr lang="en-US"/>
-          </a:p>
-          <a:p>
-            <a:endParaRPr lang="en-US"/>
-          </a:p>
-        </p:txBody>
-      </p:sp>
-      <p:sp>
-        <p:nvSpPr>
-          <p:cNvPr id="8" name="Content Placeholder 7">
-            <a:extLst>
-              <a:ext uri="{FF2B5EF4-FFF2-40B4-BE49-F238E27FC236}">
-                <a16:creationId xmlns:a16="http://schemas.microsoft.com/office/drawing/2014/main" id="{24E78C1C-E064-347C-2437-40225FA9E3E6}"/>
-              </a:ext>
-            </a:extLst>
-          </p:cNvPr>
-          <p:cNvSpPr>
-            <a:spLocks noGrp="1"/>
-          </p:cNvSpPr>
-          <p:nvPr>
-            <p:ph sz="half" idx="2"/>
-          </p:nvPr>
-        </p:nvSpPr>
-        <p:spPr/>
-        <p:txBody>
-          <a:bodyPr vert="horz" lIns="0" tIns="0" rIns="0" bIns="0" spcCol="365760" rtlCol="0" anchor="t">
-            <a:noAutofit/>
-          </a:bodyPr>
-          <a:lstStyle/>
-          <a:p>
-            <a:r>
-              <a:rPr lang="en-US" sz="2400" dirty="0">
-                <a:solidFill>
-                  <a:schemeClr val="bg2"/>
-                </a:solidFill>
-                <a:ea typeface="+mn-lt"/>
-                <a:cs typeface="+mn-lt"/>
-              </a:rPr>
-              <a:t>Response:</a:t>
-            </a:r>
-          </a:p>
-          <a:p>
-            <a:pPr marL="0" indent="0">
-              <a:buNone/>
-            </a:pPr>
-            <a:r>
-              <a:rPr lang="en-US" sz="2400" dirty="0">
-                <a:solidFill>
-                  <a:schemeClr val="bg2"/>
-                </a:solidFill>
-                <a:ea typeface="+mn-lt"/>
-                <a:cs typeface="+mn-lt"/>
-              </a:rPr>
-              <a:t>HTTP/1.1 404 Not Found\r\n </a:t>
-            </a:r>
-            <a:endParaRPr lang="en-US" sz="2400" dirty="0">
-              <a:solidFill>
-                <a:schemeClr val="bg2"/>
-              </a:solidFill>
-              <a:cs typeface="Arial"/>
-            </a:endParaRPr>
-          </a:p>
-          <a:p>
-            <a:pPr marL="0" indent="0">
-              <a:buNone/>
-            </a:pPr>
-            <a:r>
-              <a:rPr lang="en-US" sz="2400" dirty="0">
-                <a:solidFill>
-                  <a:schemeClr val="bg2"/>
-                </a:solidFill>
-                <a:ea typeface="+mn-lt"/>
-                <a:cs typeface="+mn-lt"/>
-              </a:rPr>
-              <a:t>Server: Apache/2.0.52\r\n </a:t>
-            </a:r>
-            <a:endParaRPr lang="en-US" dirty="0">
-              <a:cs typeface="Arial"/>
-            </a:endParaRPr>
-          </a:p>
-          <a:p>
-            <a:pPr marL="0" indent="0">
-              <a:buNone/>
-            </a:pPr>
-            <a:r>
-              <a:rPr lang="en-US" sz="2400" dirty="0">
-                <a:solidFill>
-                  <a:schemeClr val="bg2"/>
-                </a:solidFill>
-                <a:ea typeface="+mn-lt"/>
-                <a:cs typeface="+mn-lt"/>
-              </a:rPr>
-              <a:t>Accept-Ranges: bytes\r\n </a:t>
-            </a:r>
-            <a:endParaRPr lang="en-US" dirty="0">
-              <a:cs typeface="Arial"/>
-            </a:endParaRPr>
-          </a:p>
-          <a:p>
-            <a:pPr marL="0" indent="0">
-              <a:buNone/>
-            </a:pPr>
-            <a:r>
-              <a:rPr lang="en-US" sz="2400" dirty="0">
-                <a:solidFill>
-                  <a:schemeClr val="bg2"/>
-                </a:solidFill>
-                <a:ea typeface="+mn-lt"/>
-                <a:cs typeface="+mn-lt"/>
-              </a:rPr>
-              <a:t>Content-Length: 2652\r\n </a:t>
-            </a:r>
-            <a:endParaRPr lang="en-US" dirty="0">
-              <a:cs typeface="Arial"/>
-            </a:endParaRPr>
-          </a:p>
-          <a:p>
-            <a:pPr marL="0" indent="0">
-              <a:buNone/>
-            </a:pPr>
-            <a:r>
-              <a:rPr lang="en-US" sz="2400" dirty="0">
-                <a:solidFill>
-                  <a:schemeClr val="bg2"/>
-                </a:solidFill>
-                <a:ea typeface="+mn-lt"/>
-                <a:cs typeface="+mn-lt"/>
-              </a:rPr>
-              <a:t>Content-Type: text/html;\r\n </a:t>
-            </a:r>
-            <a:endParaRPr lang="en-US" dirty="0">
-              <a:cs typeface="Arial"/>
-            </a:endParaRPr>
-          </a:p>
-          <a:p>
-            <a:pPr marL="0" indent="0">
-              <a:buNone/>
-            </a:pPr>
-            <a:r>
-              <a:rPr lang="en-US" sz="2400" dirty="0">
-                <a:solidFill>
-                  <a:schemeClr val="bg2"/>
-                </a:solidFill>
-                <a:ea typeface="+mn-lt"/>
-                <a:cs typeface="+mn-lt"/>
-              </a:rPr>
-              <a:t>\r\n </a:t>
-            </a:r>
-            <a:endParaRPr lang="en-US" dirty="0">
-              <a:cs typeface="Arial"/>
-            </a:endParaRPr>
-          </a:p>
-          <a:p>
-            <a:pPr marL="0" indent="0">
-              <a:buNone/>
-            </a:pPr>
-            <a:r>
-              <a:rPr lang="en-US" sz="2400" dirty="0">
-                <a:solidFill>
-                  <a:schemeClr val="bg2"/>
-                </a:solidFill>
-                <a:ea typeface="+mn-lt"/>
-                <a:cs typeface="+mn-lt"/>
-              </a:rPr>
-              <a:t>&lt;!doctype html&gt;&lt;html ... </a:t>
-            </a:r>
-            <a:endParaRPr lang="en-US" dirty="0">
+              <a:latin typeface="Courier New"/>
               <a:cs typeface="Arial"/>
             </a:endParaRPr>
           </a:p>
@@ -21713,7 +21755,7 @@
         <p:spPr>
           <a:xfrm>
             <a:off x="424649" y="1924517"/>
-            <a:ext cx="3535243" cy="556692"/>
+            <a:ext cx="4257829" cy="569829"/>
           </a:xfrm>
           <a:prstGeom prst="rect">
             <a:avLst/>
@@ -21858,8 +21900,8 @@
         </p:nvSpPr>
         <p:spPr>
           <a:xfrm>
-            <a:off x="6126510" y="1924516"/>
-            <a:ext cx="4126451" cy="569829"/>
+            <a:off x="6113373" y="1924516"/>
+            <a:ext cx="5348277" cy="582966"/>
           </a:xfrm>
           <a:prstGeom prst="rect">
             <a:avLst/>
@@ -22004,8 +22046,8 @@
         </p:nvSpPr>
         <p:spPr>
           <a:xfrm>
-            <a:off x="424650" y="2515599"/>
-            <a:ext cx="3535243" cy="981919"/>
+            <a:off x="424650" y="2502462"/>
+            <a:ext cx="4244691" cy="981919"/>
           </a:xfrm>
           <a:prstGeom prst="rect">
             <a:avLst/>
@@ -22150,8 +22192,8 @@
         </p:nvSpPr>
         <p:spPr>
           <a:xfrm>
-            <a:off x="6113373" y="2528738"/>
-            <a:ext cx="4139589" cy="1901574"/>
+            <a:off x="6100236" y="2515601"/>
+            <a:ext cx="5361415" cy="1914711"/>
           </a:xfrm>
           <a:prstGeom prst="rect">
             <a:avLst/>
@@ -22296,8 +22338,8 @@
         </p:nvSpPr>
         <p:spPr>
           <a:xfrm>
-            <a:off x="424650" y="3898383"/>
-            <a:ext cx="3535243" cy="523804"/>
+            <a:off x="424650" y="3885246"/>
+            <a:ext cx="4257829" cy="550078"/>
           </a:xfrm>
           <a:prstGeom prst="rect">
             <a:avLst/>
@@ -22442,8 +22484,8 @@
         </p:nvSpPr>
         <p:spPr>
           <a:xfrm>
-            <a:off x="6113373" y="4857451"/>
-            <a:ext cx="4139589" cy="510667"/>
+            <a:off x="6100236" y="4857451"/>
+            <a:ext cx="5361415" cy="510667"/>
           </a:xfrm>
           <a:prstGeom prst="rect">
             <a:avLst/>
@@ -22705,59 +22747,49 @@
                 <a:solidFill>
                   <a:schemeClr val="bg2"/>
                 </a:solidFill>
+                <a:latin typeface="Courier New"/>
                 <a:ea typeface="+mn-lt"/>
                 <a:cs typeface="+mn-lt"/>
               </a:rPr>
               <a:t>Method = "GET”; </a:t>
             </a:r>
+          </a:p>
+          <a:p>
+            <a:pPr marL="365760" lvl="2" indent="0">
+              <a:buNone/>
+            </a:pPr>
+            <a:r>
+              <a:rPr lang="en-US" sz="2000" dirty="0">
+                <a:solidFill>
+                  <a:schemeClr val="bg2"/>
+                </a:solidFill>
+                <a:latin typeface="Courier New"/>
+                <a:ea typeface="+mn-lt"/>
+                <a:cs typeface="+mn-lt"/>
+              </a:rPr>
+              <a:t>| "HEAD"; </a:t>
+            </a:r>
+          </a:p>
+          <a:p>
+            <a:pPr marL="365760" lvl="2" indent="0">
+              <a:buNone/>
+            </a:pPr>
+            <a:r>
+              <a:rPr lang="en-US" sz="2000" dirty="0">
+                <a:solidFill>
+                  <a:schemeClr val="bg2"/>
+                </a:solidFill>
+                <a:latin typeface="Courier New"/>
+                <a:ea typeface="+mn-lt"/>
+                <a:cs typeface="+mn-lt"/>
+              </a:rPr>
+              <a:t>| "POST"; </a:t>
+            </a:r>
             <a:endParaRPr lang="en-US" sz="2000">
               <a:solidFill>
                 <a:schemeClr val="bg2"/>
               </a:solidFill>
-              <a:ea typeface="+mn-lt"/>
-              <a:cs typeface="+mn-lt"/>
-            </a:endParaRPr>
-          </a:p>
-          <a:p>
-            <a:pPr marL="365760" lvl="2" indent="0">
-              <a:buNone/>
-            </a:pPr>
-            <a:r>
-              <a:rPr lang="en-US" sz="2000" dirty="0">
-                <a:solidFill>
-                  <a:schemeClr val="bg2"/>
-                </a:solidFill>
-                <a:ea typeface="+mn-lt"/>
-                <a:cs typeface="+mn-lt"/>
-              </a:rPr>
-              <a:t>| "HEAD"; </a:t>
-            </a:r>
-            <a:endParaRPr lang="en-US" sz="2000">
-              <a:solidFill>
-                <a:schemeClr val="bg2"/>
-              </a:solidFill>
-              <a:ea typeface="+mn-lt"/>
-              <a:cs typeface="+mn-lt"/>
-            </a:endParaRPr>
-          </a:p>
-          <a:p>
-            <a:pPr marL="365760" lvl="2" indent="0">
-              <a:buNone/>
-            </a:pPr>
-            <a:r>
-              <a:rPr lang="en-US" sz="2000" dirty="0">
-                <a:solidFill>
-                  <a:schemeClr val="bg2"/>
-                </a:solidFill>
-                <a:ea typeface="+mn-lt"/>
-                <a:cs typeface="+mn-lt"/>
-              </a:rPr>
-              <a:t>| "POST"; </a:t>
-            </a:r>
-            <a:endParaRPr lang="en-US" sz="2000">
-              <a:solidFill>
-                <a:schemeClr val="bg2"/>
-              </a:solidFill>
+              <a:latin typeface="Courier New"/>
               <a:cs typeface="Arial"/>
             </a:endParaRPr>
           </a:p>
@@ -22770,6 +22802,7 @@
                 <a:solidFill>
                   <a:schemeClr val="bg2"/>
                 </a:solidFill>
+                <a:latin typeface="Courier New"/>
                 <a:ea typeface="+mn-lt"/>
                 <a:cs typeface="+mn-lt"/>
               </a:rPr>
@@ -22952,6 +22985,7 @@
                 <a:solidFill>
                   <a:schemeClr val="bg2"/>
                 </a:solidFill>
+                <a:latin typeface="Courier New"/>
                 <a:ea typeface="+mn-lt"/>
                 <a:cs typeface="+mn-lt"/>
               </a:rPr>
@@ -22961,6 +22995,7 @@
               <a:solidFill>
                 <a:schemeClr val="bg2"/>
               </a:solidFill>
+              <a:latin typeface="Courier New"/>
               <a:cs typeface="Arial"/>
             </a:endParaRPr>
           </a:p>
@@ -22973,6 +23008,7 @@
                 <a:solidFill>
                   <a:schemeClr val="bg2"/>
                 </a:solidFill>
+                <a:latin typeface="Courier New"/>
                 <a:ea typeface="+mn-lt"/>
                 <a:cs typeface="+mn-lt"/>
               </a:rPr>
@@ -22982,6 +23018,7 @@
               <a:solidFill>
                 <a:schemeClr val="bg2"/>
               </a:solidFill>
+              <a:latin typeface="Courier New"/>
               <a:cs typeface="Arial"/>
             </a:endParaRPr>
           </a:p>
@@ -22994,6 +23031,7 @@
                 <a:solidFill>
                   <a:schemeClr val="bg2"/>
                 </a:solidFill>
+                <a:latin typeface="Courier New"/>
                 <a:ea typeface="+mn-lt"/>
                 <a:cs typeface="+mn-lt"/>
               </a:rPr>
@@ -23003,6 +23041,7 @@
               <a:solidFill>
                 <a:schemeClr val="bg2"/>
               </a:solidFill>
+              <a:latin typeface="Courier New"/>
               <a:cs typeface="Arial"/>
             </a:endParaRPr>
           </a:p>
@@ -23015,6 +23054,7 @@
                 <a:solidFill>
                   <a:schemeClr val="bg2"/>
                 </a:solidFill>
+                <a:latin typeface="Courier New"/>
                 <a:ea typeface="+mn-lt"/>
                 <a:cs typeface="+mn-lt"/>
               </a:rPr>
@@ -23024,6 +23064,7 @@
               <a:solidFill>
                 <a:schemeClr val="bg2"/>
               </a:solidFill>
+              <a:latin typeface="Courier New"/>
               <a:cs typeface="Arial"/>
             </a:endParaRPr>
           </a:p>
@@ -23036,6 +23077,7 @@
                 <a:solidFill>
                   <a:schemeClr val="bg2"/>
                 </a:solidFill>
+                <a:latin typeface="Courier New"/>
                 <a:ea typeface="+mn-lt"/>
                 <a:cs typeface="+mn-lt"/>
               </a:rPr>
@@ -23045,6 +23087,7 @@
               <a:solidFill>
                 <a:schemeClr val="bg2"/>
               </a:solidFill>
+              <a:latin typeface="Courier New"/>
               <a:cs typeface="Arial"/>
             </a:endParaRPr>
           </a:p>
@@ -23057,6 +23100,7 @@
                 <a:solidFill>
                   <a:schemeClr val="bg2"/>
                 </a:solidFill>
+                <a:latin typeface="Courier New"/>
                 <a:ea typeface="+mn-lt"/>
                 <a:cs typeface="+mn-lt"/>
               </a:rPr>
@@ -23066,6 +23110,7 @@
               <a:solidFill>
                 <a:schemeClr val="bg2"/>
               </a:solidFill>
+              <a:latin typeface="Courier New"/>
               <a:cs typeface="Arial"/>
             </a:endParaRPr>
           </a:p>
@@ -23078,6 +23123,7 @@
                 <a:solidFill>
                   <a:schemeClr val="bg2"/>
                 </a:solidFill>
+                <a:latin typeface="Courier New"/>
                 <a:ea typeface="+mn-lt"/>
                 <a:cs typeface="+mn-lt"/>
               </a:rPr>
@@ -23087,6 +23133,7 @@
               <a:solidFill>
                 <a:schemeClr val="bg2"/>
               </a:solidFill>
+              <a:latin typeface="Courier New"/>
               <a:cs typeface="Arial"/>
             </a:endParaRPr>
           </a:p>
@@ -23099,6 +23146,7 @@
                 <a:solidFill>
                   <a:schemeClr val="bg2"/>
                 </a:solidFill>
+                <a:latin typeface="Courier New"/>
                 <a:ea typeface="+mn-lt"/>
                 <a:cs typeface="+mn-lt"/>
               </a:rPr>
@@ -23108,6 +23156,7 @@
               <a:solidFill>
                 <a:schemeClr val="bg2"/>
               </a:solidFill>
+              <a:latin typeface="Courier New"/>
               <a:cs typeface="Arial"/>
             </a:endParaRPr>
           </a:p>
@@ -23120,6 +23169,7 @@
                 <a:solidFill>
                   <a:schemeClr val="bg2"/>
                 </a:solidFill>
+                <a:latin typeface="Courier New"/>
                 <a:ea typeface="+mn-lt"/>
                 <a:cs typeface="+mn-lt"/>
               </a:rPr>
@@ -23129,6 +23179,7 @@
               <a:solidFill>
                 <a:schemeClr val="bg2"/>
               </a:solidFill>
+              <a:latin typeface="Courier New"/>
               <a:cs typeface="Arial"/>
             </a:endParaRPr>
           </a:p>
@@ -23141,6 +23192,7 @@
                 <a:solidFill>
                   <a:schemeClr val="bg2"/>
                 </a:solidFill>
+                <a:latin typeface="Courier New"/>
                 <a:ea typeface="+mn-lt"/>
                 <a:cs typeface="+mn-lt"/>
               </a:rPr>
@@ -23150,6 +23202,7 @@
               <a:solidFill>
                 <a:schemeClr val="bg2"/>
               </a:solidFill>
+              <a:latin typeface="Courier New"/>
               <a:cs typeface="Arial"/>
             </a:endParaRPr>
           </a:p>
@@ -23162,6 +23215,7 @@
                 <a:solidFill>
                   <a:schemeClr val="bg2"/>
                 </a:solidFill>
+                <a:latin typeface="Courier New"/>
                 <a:ea typeface="+mn-lt"/>
                 <a:cs typeface="+mn-lt"/>
               </a:rPr>
@@ -23171,6 +23225,7 @@
               <a:solidFill>
                 <a:schemeClr val="bg2"/>
               </a:solidFill>
+              <a:latin typeface="Courier New"/>
               <a:cs typeface="Arial"/>
             </a:endParaRPr>
           </a:p>
@@ -23183,6 +23238,7 @@
                 <a:solidFill>
                   <a:schemeClr val="bg2"/>
                 </a:solidFill>
+                <a:latin typeface="Courier New"/>
                 <a:ea typeface="+mn-lt"/>
                 <a:cs typeface="+mn-lt"/>
               </a:rPr>
@@ -23192,6 +23248,7 @@
               <a:solidFill>
                 <a:schemeClr val="bg2"/>
               </a:solidFill>
+              <a:latin typeface="Courier New"/>
               <a:cs typeface="Arial"/>
             </a:endParaRPr>
           </a:p>
@@ -23204,6 +23261,7 @@
                 <a:solidFill>
                   <a:schemeClr val="bg2"/>
                 </a:solidFill>
+                <a:latin typeface="Courier New"/>
                 <a:ea typeface="+mn-lt"/>
                 <a:cs typeface="+mn-lt"/>
               </a:rPr>
@@ -23213,6 +23271,7 @@
               <a:solidFill>
                 <a:schemeClr val="bg2"/>
               </a:solidFill>
+              <a:latin typeface="Courier New"/>
               <a:cs typeface="Arial"/>
             </a:endParaRPr>
           </a:p>
@@ -23225,6 +23284,7 @@
                 <a:solidFill>
                   <a:schemeClr val="bg2"/>
                 </a:solidFill>
+                <a:latin typeface="Courier New"/>
                 <a:ea typeface="+mn-lt"/>
                 <a:cs typeface="+mn-lt"/>
               </a:rPr>
@@ -23234,6 +23294,7 @@
               <a:solidFill>
                 <a:schemeClr val="bg2"/>
               </a:solidFill>
+              <a:latin typeface="Courier New"/>
               <a:cs typeface="Arial"/>
             </a:endParaRPr>
           </a:p>
@@ -23246,6 +23307,7 @@
                 <a:solidFill>
                   <a:schemeClr val="bg2"/>
                 </a:solidFill>
+                <a:latin typeface="Courier New"/>
                 <a:ea typeface="+mn-lt"/>
                 <a:cs typeface="+mn-lt"/>
               </a:rPr>
@@ -23255,6 +23317,7 @@
               <a:solidFill>
                 <a:schemeClr val="bg2"/>
               </a:solidFill>
+              <a:latin typeface="Courier New"/>
               <a:cs typeface="Arial"/>
             </a:endParaRPr>
           </a:p>
@@ -23267,6 +23330,7 @@
                 <a:solidFill>
                   <a:schemeClr val="bg2"/>
                 </a:solidFill>
+                <a:latin typeface="Courier New"/>
                 <a:ea typeface="+mn-lt"/>
                 <a:cs typeface="+mn-lt"/>
               </a:rPr>
@@ -23276,6 +23340,7 @@
               <a:solidFill>
                 <a:schemeClr val="bg2"/>
               </a:solidFill>
+              <a:latin typeface="Courier New"/>
               <a:cs typeface="Arial"/>
             </a:endParaRPr>
           </a:p>
@@ -23525,7 +23590,7 @@
           </a:p>
           <a:p>
             <a:r>
-              <a:rPr lang="en-US" sz="2800">
+              <a:rPr lang="en-US" sz="2800" dirty="0">
                 <a:solidFill>
                   <a:schemeClr val="bg2"/>
                 </a:solidFill>
@@ -23787,7 +23852,7 @@
           </a:p>
           <a:p>
             <a:r>
-              <a:rPr lang="en-US" sz="2800">
+              <a:rPr lang="en-US" sz="2800" dirty="0">
                 <a:solidFill>
                   <a:schemeClr val="bg2"/>
                 </a:solidFill>

</xml_diff>